<commit_message>
Add mid project report presentation.
</commit_message>
<xml_diff>
--- a/[OLD] - [OBSOLETE]/Docs/Eyetalk Presentation [11-29-2025].pptx
+++ b/[OLD] - [OBSOLETE]/Docs/Eyetalk Presentation [11-29-2025].pptx
@@ -7612,7 +7612,7 @@
           <a:p>
             <a:fld id="{34350B40-E974-47BB-8D7E-BE29953C11B9}" type="datetimeFigureOut">
               <a:rPr lang="en-US" smtClean="0"/>
-              <a:t>11/29/2025</a:t>
+              <a:t>2/14/2026</a:t>
             </a:fld>
             <a:endParaRPr lang="en-US"/>
           </a:p>
@@ -8203,7 +8203,7 @@
           <a:p>
             <a:fld id="{02AC24A9-CCB6-4F8D-B8DB-C2F3692CFA5A}" type="datetimeFigureOut">
               <a:rPr lang="en-US" smtClean="0"/>
-              <a:t>11/29/2025</a:t>
+              <a:t>2/14/2026</a:t>
             </a:fld>
             <a:endParaRPr lang="en-US" dirty="0"/>
           </a:p>
@@ -8573,7 +8573,7 @@
           <a:p>
             <a:fld id="{02AC24A9-CCB6-4F8D-B8DB-C2F3692CFA5A}" type="datetimeFigureOut">
               <a:rPr lang="en-US" smtClean="0"/>
-              <a:t>11/29/2025</a:t>
+              <a:t>2/14/2026</a:t>
             </a:fld>
             <a:endParaRPr lang="en-US"/>
           </a:p>
@@ -8782,7 +8782,7 @@
           <a:p>
             <a:fld id="{02AC24A9-CCB6-4F8D-B8DB-C2F3692CFA5A}" type="datetimeFigureOut">
               <a:rPr lang="en-US" smtClean="0"/>
-              <a:t>11/29/2025</a:t>
+              <a:t>2/14/2026</a:t>
             </a:fld>
             <a:endParaRPr lang="en-US"/>
           </a:p>
@@ -9252,7 +9252,7 @@
           <a:p>
             <a:fld id="{02AC24A9-CCB6-4F8D-B8DB-C2F3692CFA5A}" type="datetimeFigureOut">
               <a:rPr lang="en-US" smtClean="0"/>
-              <a:t>11/29/2025</a:t>
+              <a:t>2/14/2026</a:t>
             </a:fld>
             <a:endParaRPr lang="en-US"/>
           </a:p>
@@ -9706,7 +9706,7 @@
           <a:p>
             <a:fld id="{02AC24A9-CCB6-4F8D-B8DB-C2F3692CFA5A}" type="datetimeFigureOut">
               <a:rPr lang="en-US" smtClean="0"/>
-              <a:t>11/29/2025</a:t>
+              <a:t>2/14/2026</a:t>
             </a:fld>
             <a:endParaRPr lang="en-US"/>
           </a:p>
@@ -10238,7 +10238,7 @@
           <a:p>
             <a:fld id="{02AC24A9-CCB6-4F8D-B8DB-C2F3692CFA5A}" type="datetimeFigureOut">
               <a:rPr lang="en-US" smtClean="0"/>
-              <a:t>11/29/2025</a:t>
+              <a:t>2/14/2026</a:t>
             </a:fld>
             <a:endParaRPr lang="en-US"/>
           </a:p>
@@ -10937,7 +10937,7 @@
           <a:p>
             <a:fld id="{02AC24A9-CCB6-4F8D-B8DB-C2F3692CFA5A}" type="datetimeFigureOut">
               <a:rPr lang="en-US" smtClean="0"/>
-              <a:t>11/29/2025</a:t>
+              <a:t>2/14/2026</a:t>
             </a:fld>
             <a:endParaRPr lang="en-US"/>
           </a:p>
@@ -11266,7 +11266,7 @@
           <a:p>
             <a:fld id="{02AC24A9-CCB6-4F8D-B8DB-C2F3692CFA5A}" type="datetimeFigureOut">
               <a:rPr lang="en-US" smtClean="0"/>
-              <a:t>11/29/2025</a:t>
+              <a:t>2/14/2026</a:t>
             </a:fld>
             <a:endParaRPr lang="en-US"/>
           </a:p>
@@ -11379,7 +11379,7 @@
           <a:p>
             <a:fld id="{02AC24A9-CCB6-4F8D-B8DB-C2F3692CFA5A}" type="datetimeFigureOut">
               <a:rPr lang="en-US" smtClean="0"/>
-              <a:t>11/29/2025</a:t>
+              <a:t>2/14/2026</a:t>
             </a:fld>
             <a:endParaRPr lang="en-US"/>
           </a:p>
@@ -11874,7 +11874,7 @@
           <a:p>
             <a:fld id="{02AC24A9-CCB6-4F8D-B8DB-C2F3692CFA5A}" type="datetimeFigureOut">
               <a:rPr lang="en-US" smtClean="0"/>
-              <a:t>11/29/2025</a:t>
+              <a:t>2/14/2026</a:t>
             </a:fld>
             <a:endParaRPr lang="en-US" dirty="0"/>
           </a:p>
@@ -12351,7 +12351,7 @@
           <a:p>
             <a:fld id="{02AC24A9-CCB6-4F8D-B8DB-C2F3692CFA5A}" type="datetimeFigureOut">
               <a:rPr lang="en-US" smtClean="0"/>
-              <a:t>11/29/2025</a:t>
+              <a:t>2/14/2026</a:t>
             </a:fld>
             <a:endParaRPr lang="en-US"/>
           </a:p>
@@ -12594,7 +12594,7 @@
           <a:p>
             <a:fld id="{02AC24A9-CCB6-4F8D-B8DB-C2F3692CFA5A}" type="datetimeFigureOut">
               <a:rPr lang="en-US" smtClean="0"/>
-              <a:t>11/29/2025</a:t>
+              <a:t>2/14/2026</a:t>
             </a:fld>
             <a:endParaRPr lang="en-US"/>
           </a:p>

</xml_diff>